<commit_message>
more small polish edits
</commit_message>
<xml_diff>
--- a/docker/03_Working_with_containers.pptx
+++ b/docker/03_Working_with_containers.pptx
@@ -582,8 +582,11 @@
           <a:p>
             <a:r>
               <a:rPr lang="en-US" dirty="0"/>
-              <a:t>When talking about a “container”, we are referring to the combination of read-only layers from the image and a read-write layer on top of it. You can derive an indefinitely number of containers from the same image. They only vary by the read-write layer on top.</a:t>
-            </a:r>
+              <a:t>When talking about a “container”, we are referring to the combination of read-only layers from the image and one read-write layer on top of it. You can derive / instantiate an indefinite number of containers from the same image. They only vary by the read-write layer on top. Or stated another way: A container consists of just the read-write layer, some meta data (settings, flags pass on start) and a reference to the image. All containers share only one common image.</a:t>
+            </a:r>
+          </a:p>
+          <a:p>
+            <a:endParaRPr lang="en-US" dirty="0"/>
           </a:p>
           <a:p>
             <a:r>
@@ -608,7 +611,7 @@
             </a:r>
             <a:r>
               <a:rPr lang="en-US" dirty="0"/>
-              <a:t>” the read-write layer everything is gone irretrievable. </a:t>
+              <a:t>” the read-write layer everything is irretrievably gone. </a:t>
             </a:r>
           </a:p>
         </p:txBody>
@@ -641,6 +644,98 @@
     <p:extLst>
       <p:ext uri="{BB962C8B-B14F-4D97-AF65-F5344CB8AC3E}">
         <p14:creationId xmlns:p14="http://schemas.microsoft.com/office/powerpoint/2010/main" val="1174518122"/>
+      </p:ext>
+    </p:extLst>
+  </p:cSld>
+  <p:clrMapOvr>
+    <a:masterClrMapping/>
+  </p:clrMapOvr>
+</p:notes>
+</file>
+
+<file path=ppt/notesSlides/notesSlide10.xml><?xml version="1.0" encoding="utf-8"?>
+<p:notes xmlns:a="http://schemas.openxmlformats.org/drawingml/2006/main" xmlns:r="http://schemas.openxmlformats.org/officeDocument/2006/relationships" xmlns:p="http://schemas.openxmlformats.org/presentationml/2006/main">
+  <p:cSld>
+    <p:spTree>
+      <p:nvGrpSpPr>
+        <p:cNvPr id="1" name=""/>
+        <p:cNvGrpSpPr/>
+        <p:nvPr/>
+      </p:nvGrpSpPr>
+      <p:grpSpPr>
+        <a:xfrm>
+          <a:off x="0" y="0"/>
+          <a:ext cx="0" cy="0"/>
+          <a:chOff x="0" y="0"/>
+          <a:chExt cx="0" cy="0"/>
+        </a:xfrm>
+      </p:grpSpPr>
+      <p:sp>
+        <p:nvSpPr>
+          <p:cNvPr id="4" name="Slide Number Placeholder 3"/>
+          <p:cNvSpPr>
+            <a:spLocks noGrp="1"/>
+          </p:cNvSpPr>
+          <p:nvPr>
+            <p:ph type="sldNum" sz="quarter" idx="10"/>
+          </p:nvPr>
+        </p:nvSpPr>
+        <p:spPr/>
+        <p:txBody>
+          <a:bodyPr/>
+          <a:lstStyle/>
+          <a:p>
+            <a:fld id="{7D8C2C35-2B8A-446E-BEC0-FD36716C29AC}" type="slidenum">
+              <a:rPr lang="de-DE" smtClean="0"/>
+              <a:pPr/>
+              <a:t>18</a:t>
+            </a:fld>
+            <a:endParaRPr lang="de-DE" dirty="0"/>
+          </a:p>
+        </p:txBody>
+      </p:sp>
+      <p:sp>
+        <p:nvSpPr>
+          <p:cNvPr id="6" name="Slide Image Placeholder 5"/>
+          <p:cNvSpPr>
+            <a:spLocks noGrp="1" noRot="1" noChangeAspect="1"/>
+          </p:cNvSpPr>
+          <p:nvPr>
+            <p:ph type="sldImg"/>
+          </p:nvPr>
+        </p:nvSpPr>
+        <p:spPr>
+          <a:xfrm>
+            <a:off x="547688" y="612775"/>
+            <a:ext cx="5762625" cy="3241675"/>
+          </a:xfrm>
+        </p:spPr>
+      </p:sp>
+      <p:sp>
+        <p:nvSpPr>
+          <p:cNvPr id="7" name="Notes Placeholder 6"/>
+          <p:cNvSpPr>
+            <a:spLocks noGrp="1"/>
+          </p:cNvSpPr>
+          <p:nvPr>
+            <p:ph type="body" idx="1"/>
+          </p:nvPr>
+        </p:nvSpPr>
+        <p:spPr/>
+        <p:txBody>
+          <a:bodyPr>
+            <a:normAutofit/>
+          </a:bodyPr>
+          <a:lstStyle/>
+          <a:p>
+            <a:endParaRPr lang="en-US"/>
+          </a:p>
+        </p:txBody>
+      </p:sp>
+    </p:spTree>
+    <p:extLst>
+      <p:ext uri="{BB962C8B-B14F-4D97-AF65-F5344CB8AC3E}">
+        <p14:creationId xmlns:p14="http://schemas.microsoft.com/office/powerpoint/2010/main" val="2544264309"/>
       </p:ext>
     </p:extLst>
   </p:cSld>
@@ -696,7 +791,7 @@
           <a:p>
             <a:r>
               <a:rPr lang="en-US" dirty="0"/>
-              <a:t>Firstly, lets take a look at how terminals used to work. The standard input stream (stdin) is used to send input to the process. The standard output and error streams send the output to a terminal to display (as text). </a:t>
+              <a:t>First, lets take a look at how terminals used to work. The standard input stream (stdin) is used to send input to the process. The standard output and error streams send the output to a terminal to display (as text). </a:t>
             </a:r>
           </a:p>
           <a:p>
@@ -737,7 +832,7 @@
             </a:r>
             <a:r>
               <a:rPr lang="en-US" dirty="0"/>
-              <a:t> ubuntu:18.04” – you will be able to type (something like “exit”) but you don’t see the output. Try the same again, but add a “-t”. You will be able to type &amp; see what happens.</a:t>
+              <a:t> ubuntu:18.04” – you will be able to type (something like “exit”) but you don’t see the output. Try the same again, but adding a “-t”. You will be able to type &amp; see what happens.</a:t>
             </a:r>
           </a:p>
           <a:p>
@@ -760,7 +855,7 @@
           <a:p>
             <a:r>
               <a:rPr lang="en-US" dirty="0"/>
-              <a:t>Docker also allows to start containers in background (similar to a </a:t>
+              <a:t>Docker also allows to start containers in the background (similar to a </a:t>
             </a:r>
             <a:r>
               <a:rPr lang="en-US" dirty="0" err="1"/>
@@ -768,7 +863,7 @@
             </a:r>
             <a:r>
               <a:rPr lang="en-US" dirty="0"/>
-              <a:t> process started in background). No output will be sent to the user but captured for logging (check the container logs, if there are any). Use the –d switch to run the process in background and check with “docker </a:t>
+              <a:t> processes started in background). No output will be sent to the user but captured for logging (check the container logs, if there are any). Use the –d switch ('daemon') to run the process in background and check with “docker </a:t>
             </a:r>
             <a:r>
               <a:rPr lang="en-US" dirty="0" err="1"/>
@@ -1096,6 +1191,167 @@
               <a:t>.</a:t>
             </a:r>
           </a:p>
+          <a:p>
+            <a:endParaRPr lang="de-DE" baseline="0" dirty="0"/>
+          </a:p>
+          <a:p>
+            <a:r>
+              <a:rPr lang="de-DE" baseline="0" dirty="0"/>
+              <a:t>A </a:t>
+            </a:r>
+            <a:r>
+              <a:rPr lang="de-DE" baseline="0" dirty="0" err="1"/>
+              <a:t>stopped</a:t>
+            </a:r>
+            <a:r>
+              <a:rPr lang="de-DE" baseline="0" dirty="0"/>
+              <a:t> </a:t>
+            </a:r>
+            <a:r>
+              <a:rPr lang="de-DE" baseline="0" dirty="0" err="1"/>
+              <a:t>container</a:t>
+            </a:r>
+            <a:r>
+              <a:rPr lang="de-DE" baseline="0" dirty="0"/>
+              <a:t> </a:t>
+            </a:r>
+            <a:r>
+              <a:rPr lang="de-DE" baseline="0" dirty="0" err="1"/>
+              <a:t>retains</a:t>
+            </a:r>
+            <a:r>
+              <a:rPr lang="de-DE" baseline="0" dirty="0"/>
+              <a:t> </a:t>
+            </a:r>
+            <a:r>
+              <a:rPr lang="de-DE" baseline="0" dirty="0" err="1"/>
+              <a:t>the</a:t>
+            </a:r>
+            <a:r>
+              <a:rPr lang="de-DE" baseline="0" dirty="0"/>
+              <a:t> </a:t>
+            </a:r>
+            <a:r>
+              <a:rPr lang="de-DE" baseline="0" dirty="0" err="1"/>
+              <a:t>state</a:t>
+            </a:r>
+            <a:r>
+              <a:rPr lang="de-DE" baseline="0" dirty="0"/>
+              <a:t> </a:t>
+            </a:r>
+            <a:r>
+              <a:rPr lang="de-DE" baseline="0" dirty="0" err="1"/>
+              <a:t>of</a:t>
+            </a:r>
+            <a:r>
+              <a:rPr lang="de-DE" baseline="0" dirty="0"/>
+              <a:t> </a:t>
+            </a:r>
+            <a:r>
+              <a:rPr lang="de-DE" baseline="0" dirty="0" err="1"/>
+              <a:t>its</a:t>
+            </a:r>
+            <a:r>
+              <a:rPr lang="de-DE" baseline="0" dirty="0"/>
+              <a:t> r/w </a:t>
+            </a:r>
+            <a:r>
+              <a:rPr lang="de-DE" baseline="0" dirty="0" err="1"/>
+              <a:t>file</a:t>
+            </a:r>
+            <a:r>
+              <a:rPr lang="de-DE" baseline="0" dirty="0"/>
+              <a:t> </a:t>
+            </a:r>
+            <a:r>
+              <a:rPr lang="de-DE" baseline="0" dirty="0" err="1"/>
+              <a:t>system</a:t>
+            </a:r>
+            <a:r>
+              <a:rPr lang="de-DE" baseline="0" dirty="0"/>
+              <a:t> </a:t>
+            </a:r>
+            <a:r>
+              <a:rPr lang="de-DE" baseline="0" dirty="0" err="1"/>
+              <a:t>layer</a:t>
+            </a:r>
+            <a:r>
+              <a:rPr lang="de-DE" baseline="0" dirty="0"/>
+              <a:t> (</a:t>
+            </a:r>
+            <a:r>
+              <a:rPr lang="de-DE" baseline="0" dirty="0" err="1"/>
+              <a:t>you</a:t>
+            </a:r>
+            <a:r>
+              <a:rPr lang="de-DE" baseline="0" dirty="0"/>
+              <a:t> </a:t>
+            </a:r>
+            <a:r>
+              <a:rPr lang="de-DE" baseline="0" dirty="0" err="1"/>
+              <a:t>see</a:t>
+            </a:r>
+            <a:r>
+              <a:rPr lang="de-DE" baseline="0" dirty="0"/>
+              <a:t> </a:t>
+            </a:r>
+            <a:r>
+              <a:rPr lang="de-DE" baseline="0" dirty="0" err="1"/>
+              <a:t>them</a:t>
+            </a:r>
+            <a:r>
+              <a:rPr lang="de-DE" baseline="0" dirty="0"/>
+              <a:t> </a:t>
+            </a:r>
+            <a:r>
+              <a:rPr lang="de-DE" baseline="0" dirty="0" err="1"/>
+              <a:t>when</a:t>
+            </a:r>
+            <a:r>
+              <a:rPr lang="de-DE" baseline="0" dirty="0"/>
+              <a:t> </a:t>
+            </a:r>
+            <a:r>
+              <a:rPr lang="de-DE" baseline="0" dirty="0" err="1"/>
+              <a:t>you</a:t>
+            </a:r>
+            <a:r>
+              <a:rPr lang="de-DE" baseline="0" dirty="0"/>
+              <a:t> </a:t>
+            </a:r>
+            <a:r>
+              <a:rPr lang="de-DE" baseline="0" dirty="0" err="1"/>
+              <a:t>start</a:t>
+            </a:r>
+            <a:r>
+              <a:rPr lang="de-DE" baseline="0" dirty="0"/>
+              <a:t> </a:t>
+            </a:r>
+            <a:r>
+              <a:rPr lang="de-DE" baseline="0" dirty="0" err="1"/>
+              <a:t>the</a:t>
+            </a:r>
+            <a:r>
+              <a:rPr lang="de-DE" baseline="0" dirty="0"/>
+              <a:t> </a:t>
+            </a:r>
+            <a:r>
+              <a:rPr lang="de-DE" baseline="0" dirty="0" err="1"/>
+              <a:t>container</a:t>
+            </a:r>
+            <a:r>
+              <a:rPr lang="de-DE" baseline="0" dirty="0"/>
+              <a:t> </a:t>
+            </a:r>
+            <a:r>
+              <a:rPr lang="de-DE" baseline="0" dirty="0" err="1"/>
+              <a:t>again</a:t>
+            </a:r>
+            <a:r>
+              <a:rPr lang="de-DE" baseline="0" dirty="0"/>
+              <a:t>)</a:t>
+            </a:r>
+          </a:p>
         </p:txBody>
       </p:sp>
       <p:sp>
@@ -1275,7 +1531,7 @@
           <a:bodyPr/>
           <a:lstStyle/>
           <a:p>
-            <a:endParaRPr lang="de-DE" dirty="0"/>
+            <a:endParaRPr lang="en-US" dirty="0"/>
           </a:p>
         </p:txBody>
       </p:sp>
@@ -1297,7 +1553,7 @@
             <a:fld id="{7D8C2C35-2B8A-446E-BEC0-FD36716C29AC}" type="slidenum">
               <a:rPr lang="de-DE" smtClean="0"/>
               <a:pPr/>
-              <a:t>13</a:t>
+              <a:t>10</a:t>
             </a:fld>
             <a:endParaRPr lang="de-DE" dirty="0"/>
           </a:p>
@@ -1306,7 +1562,7 @@
     </p:spTree>
     <p:extLst>
       <p:ext uri="{BB962C8B-B14F-4D97-AF65-F5344CB8AC3E}">
-        <p14:creationId xmlns:p14="http://schemas.microsoft.com/office/powerpoint/2010/main" val="2439948182"/>
+        <p14:creationId xmlns:p14="http://schemas.microsoft.com/office/powerpoint/2010/main" val="1911736133"/>
       </p:ext>
     </p:extLst>
   </p:cSld>
@@ -1382,7 +1638,7 @@
             <a:fld id="{7D8C2C35-2B8A-446E-BEC0-FD36716C29AC}" type="slidenum">
               <a:rPr lang="de-DE" smtClean="0"/>
               <a:pPr/>
-              <a:t>14</a:t>
+              <a:t>13</a:t>
             </a:fld>
             <a:endParaRPr lang="de-DE" dirty="0"/>
           </a:p>
@@ -1391,7 +1647,7 @@
     </p:spTree>
     <p:extLst>
       <p:ext uri="{BB962C8B-B14F-4D97-AF65-F5344CB8AC3E}">
-        <p14:creationId xmlns:p14="http://schemas.microsoft.com/office/powerpoint/2010/main" val="987598064"/>
+        <p14:creationId xmlns:p14="http://schemas.microsoft.com/office/powerpoint/2010/main" val="2439948182"/>
       </p:ext>
     </p:extLst>
   </p:cSld>
@@ -1445,79 +1701,7 @@
           <a:bodyPr/>
           <a:lstStyle/>
           <a:p>
-            <a:r>
-              <a:rPr lang="en-US" noProof="0" dirty="0"/>
-              <a:t>Every docker host spins up a local private network. A container will get an IP address form this network to be reachable locally. So as long as all container are on the same host, they can communicate via this network. </a:t>
-            </a:r>
-          </a:p>
-          <a:p>
-            <a:endParaRPr lang="en-US" noProof="0" dirty="0"/>
-          </a:p>
-          <a:p>
-            <a:r>
-              <a:rPr lang="en-US" noProof="0" dirty="0"/>
-              <a:t>However, this is a very unlikely scenario. Probably there are more hosts involved or you want to expose your application to the outside. Docker supports network address translation to map a &lt;container </a:t>
-            </a:r>
-            <a:r>
-              <a:rPr lang="en-US" noProof="0" dirty="0" err="1"/>
-              <a:t>ip</a:t>
-            </a:r>
-            <a:r>
-              <a:rPr lang="en-US" noProof="0" dirty="0"/>
-              <a:t>&gt;: &lt;port&gt; to a port on the external network interface of the docker host. If you have a container with 172.16.0.2:80 locally it could be exposed to the outside on 192.168.52.1:32710 (</a:t>
-            </a:r>
-            <a:r>
-              <a:rPr lang="en-US" noProof="0" dirty="0" err="1"/>
-              <a:t>ip</a:t>
-            </a:r>
-            <a:r>
-              <a:rPr lang="en-US" noProof="0" dirty="0"/>
-              <a:t> address of the docker host + unused port).</a:t>
-            </a:r>
-          </a:p>
-          <a:p>
-            <a:endParaRPr lang="en-US" noProof="0" dirty="0"/>
-          </a:p>
-          <a:p>
-            <a:r>
-              <a:rPr lang="en-US" noProof="0" dirty="0"/>
-              <a:t>This feature is called port forwarding and docker knows two flavors of it.</a:t>
-            </a:r>
-          </a:p>
-          <a:p>
-            <a:pPr marL="342900" indent="-342900">
-              <a:buAutoNum type="arabicParenR"/>
-            </a:pPr>
-            <a:r>
-              <a:rPr lang="en-US" noProof="0" dirty="0"/>
-              <a:t>Map a dedicated host port to a container port – this has to be specified manually. So you have to keep track of all your used ports in order to avoid conflicts. Use the “-p” (lower case) switch and specify host port &amp; container port.</a:t>
-            </a:r>
-          </a:p>
-          <a:p>
-            <a:pPr marL="342900" indent="-342900">
-              <a:buAutoNum type="arabicParenR"/>
-            </a:pPr>
-            <a:r>
-              <a:rPr lang="en-US" noProof="0" dirty="0"/>
-              <a:t>Map a random port to a container port. Use the “-P” (upper case) switch. Docker detects the ports a container exposes and automatically assigns an unused port. Check with “docker </a:t>
-            </a:r>
-            <a:r>
-              <a:rPr lang="en-US" noProof="0" dirty="0" err="1"/>
-              <a:t>ps</a:t>
-            </a:r>
-            <a:r>
-              <a:rPr lang="en-US" noProof="0" dirty="0"/>
-              <a:t>” or “docker container list”, which port was assigned.</a:t>
-            </a:r>
-          </a:p>
-          <a:p>
-            <a:pPr marL="342900" indent="-342900">
-              <a:buAutoNum type="arabicParenR"/>
-            </a:pPr>
-            <a:endParaRPr lang="en-US" noProof="0" dirty="0"/>
-          </a:p>
-          <a:p>
-            <a:endParaRPr lang="en-US" noProof="0" dirty="0"/>
+            <a:endParaRPr lang="de-DE" dirty="0"/>
           </a:p>
         </p:txBody>
       </p:sp>
@@ -1539,7 +1723,7 @@
             <a:fld id="{7D8C2C35-2B8A-446E-BEC0-FD36716C29AC}" type="slidenum">
               <a:rPr lang="de-DE" smtClean="0"/>
               <a:pPr/>
-              <a:t>16</a:t>
+              <a:t>14</a:t>
             </a:fld>
             <a:endParaRPr lang="de-DE" dirty="0"/>
           </a:p>
@@ -1548,7 +1732,7 @@
     </p:spTree>
     <p:extLst>
       <p:ext uri="{BB962C8B-B14F-4D97-AF65-F5344CB8AC3E}">
-        <p14:creationId xmlns:p14="http://schemas.microsoft.com/office/powerpoint/2010/main" val="173039225"/>
+        <p14:creationId xmlns:p14="http://schemas.microsoft.com/office/powerpoint/2010/main" val="987598064"/>
       </p:ext>
     </p:extLst>
   </p:cSld>
@@ -1604,7 +1788,7 @@
           <a:p>
             <a:r>
               <a:rPr lang="en-US" noProof="0" dirty="0"/>
-              <a:t>Since it is not recommendable to store data in a docker container, adding a persistence is quite important. With the volumes API it is possible to assign persistent storage to a container.</a:t>
+              <a:t>Every docker host spins up a local private network. A container will get an IP address form this network to be reachable locally. So as long as all container are on the same host, they can communicate via this network. </a:t>
             </a:r>
           </a:p>
           <a:p>
@@ -1613,7 +1797,32 @@
           <a:p>
             <a:r>
               <a:rPr lang="en-US" noProof="0" dirty="0"/>
-              <a:t>Docker supports 2 ways of doing so:</a:t>
+              <a:t>However, this is a very unlikely scenario. Probably there are more hosts involved or you want to expose your application to the outside. Docker supports network address translation to map a &lt;</a:t>
+            </a:r>
+            <a:r>
+              <a:rPr lang="en-US" noProof="0" dirty="0" err="1"/>
+              <a:t>container_ip</a:t>
+            </a:r>
+            <a:r>
+              <a:rPr lang="en-US" noProof="0" dirty="0"/>
+              <a:t>&gt;:&lt;port&gt; to a port on the external network interface of the docker host. If you have a container with 172.16.0.2:80 locally it could be exposed to the outside on 192.168.52.1:32710 (</a:t>
+            </a:r>
+            <a:r>
+              <a:rPr lang="en-US" noProof="0" dirty="0" err="1"/>
+              <a:t>ip</a:t>
+            </a:r>
+            <a:r>
+              <a:rPr lang="en-US" noProof="0" dirty="0"/>
+              <a:t> address of the docker host + unused port).</a:t>
+            </a:r>
+          </a:p>
+          <a:p>
+            <a:endParaRPr lang="en-US" noProof="0" dirty="0"/>
+          </a:p>
+          <a:p>
+            <a:r>
+              <a:rPr lang="en-US" noProof="0" dirty="0"/>
+              <a:t>This feature is called port forwarding and docker knows two flavors of it.</a:t>
             </a:r>
           </a:p>
           <a:p>
@@ -1622,15 +1831,7 @@
             </a:pPr>
             <a:r>
               <a:rPr lang="en-US" noProof="0" dirty="0"/>
-              <a:t>Bind mounts: mount a local host directory onto a certain path in the container. Everything that was present before is hidden (nature of the bind mount). For example, if you have some configuration you want to inject, write your config file, store it on your docker host at /home/container/config and mount the content of this directory to /</a:t>
-            </a:r>
-            <a:r>
-              <a:rPr lang="en-US" noProof="0" dirty="0" err="1"/>
-              <a:t>usr</a:t>
-            </a:r>
-            <a:r>
-              <a:rPr lang="en-US" noProof="0" dirty="0"/>
-              <a:t>/application/config (assuming the application reads config from there).  </a:t>
+              <a:t>Map a dedicated host port to a container port – this has to be specified manually. So you have to keep track of all your used ports in order to avoid conflicts. Use the “-p” (lower case) switch and specify host port &amp; container port.</a:t>
             </a:r>
           </a:p>
           <a:p>
@@ -1639,21 +1840,24 @@
             </a:pPr>
             <a:r>
               <a:rPr lang="en-US" noProof="0" dirty="0"/>
-              <a:t>Named volumes: docker can create a separated storage volume. Its lifecycle is independent from the container but still managed by docker. Upon creation, the content of the mount target is merged into the volume.</a:t>
-            </a:r>
-          </a:p>
-          <a:p>
-            <a:pPr marL="0" indent="0">
-              <a:buNone/>
+              <a:t>Map a random port to a container port. Use the “-P” (upper case) switch. Docker detects the ports a container exposes and automatically assigns an unused port. Check with “docker </a:t>
+            </a:r>
+            <a:r>
+              <a:rPr lang="en-US" noProof="0" dirty="0" err="1"/>
+              <a:t>ps</a:t>
+            </a:r>
+            <a:r>
+              <a:rPr lang="en-US" noProof="0" dirty="0"/>
+              <a:t>” or “docker container list”, which port was assigned.</a:t>
+            </a:r>
+          </a:p>
+          <a:p>
+            <a:pPr marL="342900" indent="-342900">
+              <a:buAutoNum type="arabicParenR"/>
             </a:pPr>
-            <a:r>
-              <a:rPr lang="en-US" noProof="0" dirty="0"/>
-              <a:t>How to differentiate between bind mounts and named volumes? When specifying an absolute path, docker assumes a bind mount. When you just give a name (like in a relative path “config”), it will assume a named volume and create </a:t>
-            </a:r>
-            <a:r>
-              <a:rPr lang="en-US" noProof="0"/>
-              <a:t>a volume “config”.</a:t>
-            </a:r>
+            <a:endParaRPr lang="en-US" noProof="0" dirty="0"/>
+          </a:p>
+          <a:p>
             <a:endParaRPr lang="en-US" noProof="0" dirty="0"/>
           </a:p>
         </p:txBody>
@@ -1676,7 +1880,7 @@
             <a:fld id="{7D8C2C35-2B8A-446E-BEC0-FD36716C29AC}" type="slidenum">
               <a:rPr lang="de-DE" smtClean="0"/>
               <a:pPr/>
-              <a:t>17</a:t>
+              <a:t>16</a:t>
             </a:fld>
             <a:endParaRPr lang="de-DE" dirty="0"/>
           </a:p>
@@ -1685,7 +1889,7 @@
     </p:spTree>
     <p:extLst>
       <p:ext uri="{BB962C8B-B14F-4D97-AF65-F5344CB8AC3E}">
-        <p14:creationId xmlns:p14="http://schemas.microsoft.com/office/powerpoint/2010/main" val="386189332"/>
+        <p14:creationId xmlns:p14="http://schemas.microsoft.com/office/powerpoint/2010/main" val="173039225"/>
       </p:ext>
     </p:extLst>
   </p:cSld>
@@ -1714,6 +1918,120 @@
       </p:grpSpPr>
       <p:sp>
         <p:nvSpPr>
+          <p:cNvPr id="2" name="Slide Image Placeholder 1"/>
+          <p:cNvSpPr>
+            <a:spLocks noGrp="1" noRot="1" noChangeAspect="1"/>
+          </p:cNvSpPr>
+          <p:nvPr>
+            <p:ph type="sldImg"/>
+          </p:nvPr>
+        </p:nvSpPr>
+        <p:spPr/>
+      </p:sp>
+      <p:sp>
+        <p:nvSpPr>
+          <p:cNvPr id="3" name="Notes Placeholder 2"/>
+          <p:cNvSpPr>
+            <a:spLocks noGrp="1"/>
+          </p:cNvSpPr>
+          <p:nvPr>
+            <p:ph type="body" idx="1"/>
+          </p:nvPr>
+        </p:nvSpPr>
+        <p:spPr/>
+        <p:txBody>
+          <a:bodyPr>
+            <a:normAutofit lnSpcReduction="10000"/>
+          </a:bodyPr>
+          <a:lstStyle/>
+          <a:p>
+            <a:r>
+              <a:rPr lang="en-US" noProof="0" dirty="0"/>
+              <a:t>Since it is not recommendable to store data in a docker container, adding a persistence is quite important. With the volumes API it is possible to assign persistent storage to a container. </a:t>
+            </a:r>
+          </a:p>
+          <a:p>
+            <a:endParaRPr lang="en-US" noProof="0" dirty="0"/>
+          </a:p>
+          <a:p>
+            <a:r>
+              <a:rPr lang="en-US" noProof="0" dirty="0"/>
+              <a:t>Docker supports 2 ways of doing so:</a:t>
+            </a:r>
+          </a:p>
+          <a:p>
+            <a:pPr marL="342900" indent="-342900">
+              <a:buAutoNum type="arabicParenR"/>
+            </a:pPr>
+            <a:r>
+              <a:rPr lang="en-US" b="1" noProof="0" dirty="0"/>
+              <a:t>Bind mounts: </a:t>
+            </a:r>
+            <a:r>
+              <a:rPr lang="en-US" noProof="0" dirty="0"/>
+              <a:t>mount a local host directory onto a certain path in the container. Everything that was present before in the target directory is hidden (nature of the bind mount). For example, if you have some configuration you want to inject, write your config file, store it on your docker host at /home/container/config and mount the content of this directory to /</a:t>
+            </a:r>
+            <a:r>
+              <a:rPr lang="en-US" noProof="0" dirty="0" err="1"/>
+              <a:t>usr</a:t>
+            </a:r>
+            <a:r>
+              <a:rPr lang="en-US" noProof="0" dirty="0"/>
+              <a:t>/application/config (assuming the application reads config from there).  </a:t>
+            </a:r>
+          </a:p>
+          <a:p>
+            <a:pPr marL="342900" indent="-342900">
+              <a:buAutoNum type="arabicParenR"/>
+            </a:pPr>
+            <a:r>
+              <a:rPr lang="en-US" b="1" noProof="0" dirty="0"/>
+              <a:t>Named volumes: </a:t>
+            </a:r>
+            <a:r>
+              <a:rPr lang="en-US" noProof="0" dirty="0"/>
+              <a:t>docker can create a separated storage volume. Its lifecycle is independent from the container but still managed by docker. Upon creation, the content of the mount target is merged into the volume. </a:t>
+            </a:r>
+          </a:p>
+          <a:p>
+            <a:pPr marL="0" indent="0">
+              <a:buNone/>
+            </a:pPr>
+            <a:endParaRPr lang="en-US" noProof="0" dirty="0"/>
+          </a:p>
+          <a:p>
+            <a:pPr marL="0" indent="0">
+              <a:buNone/>
+            </a:pPr>
+            <a:r>
+              <a:rPr lang="en-US" noProof="0" dirty="0"/>
+              <a:t>How to differentiate between bind mounts and named volumes? When specifying an absolute path, docker assumes a bind mount. When you just give a name (like in a relative path “config”), it will assume a named volume and create a volume “config”.</a:t>
+            </a:r>
+          </a:p>
+          <a:p>
+            <a:pPr marL="0" indent="0">
+              <a:buNone/>
+            </a:pPr>
+            <a:endParaRPr lang="en-US" noProof="0" dirty="0"/>
+          </a:p>
+          <a:p>
+            <a:pPr marL="0" indent="0">
+              <a:buNone/>
+            </a:pPr>
+            <a:r>
+              <a:rPr lang="en-US" noProof="0" dirty="0"/>
+              <a:t>Note: Persistent storage is 'provided' by the host. It can be a part of the file system on the host directly but also an </a:t>
+            </a:r>
+            <a:r>
+              <a:rPr lang="en-US" noProof="0"/>
+              <a:t>NFS mount. </a:t>
+            </a:r>
+            <a:endParaRPr lang="en-US" noProof="0" dirty="0"/>
+          </a:p>
+        </p:txBody>
+      </p:sp>
+      <p:sp>
+        <p:nvSpPr>
           <p:cNvPr id="4" name="Slide Number Placeholder 3"/>
           <p:cNvSpPr>
             <a:spLocks noGrp="1"/>
@@ -1730,54 +2048,16 @@
             <a:fld id="{7D8C2C35-2B8A-446E-BEC0-FD36716C29AC}" type="slidenum">
               <a:rPr lang="de-DE" smtClean="0"/>
               <a:pPr/>
-              <a:t>18</a:t>
+              <a:t>17</a:t>
             </a:fld>
             <a:endParaRPr lang="de-DE" dirty="0"/>
-          </a:p>
-        </p:txBody>
-      </p:sp>
-      <p:sp>
-        <p:nvSpPr>
-          <p:cNvPr id="6" name="Slide Image Placeholder 5"/>
-          <p:cNvSpPr>
-            <a:spLocks noGrp="1" noRot="1" noChangeAspect="1"/>
-          </p:cNvSpPr>
-          <p:nvPr>
-            <p:ph type="sldImg"/>
-          </p:nvPr>
-        </p:nvSpPr>
-        <p:spPr>
-          <a:xfrm>
-            <a:off x="547688" y="612775"/>
-            <a:ext cx="5762625" cy="3241675"/>
-          </a:xfrm>
-        </p:spPr>
-      </p:sp>
-      <p:sp>
-        <p:nvSpPr>
-          <p:cNvPr id="7" name="Notes Placeholder 6"/>
-          <p:cNvSpPr>
-            <a:spLocks noGrp="1"/>
-          </p:cNvSpPr>
-          <p:nvPr>
-            <p:ph type="body" idx="1"/>
-          </p:nvPr>
-        </p:nvSpPr>
-        <p:spPr/>
-        <p:txBody>
-          <a:bodyPr>
-            <a:normAutofit/>
-          </a:bodyPr>
-          <a:lstStyle/>
-          <a:p>
-            <a:endParaRPr lang="en-US"/>
           </a:p>
         </p:txBody>
       </p:sp>
     </p:spTree>
     <p:extLst>
       <p:ext uri="{BB962C8B-B14F-4D97-AF65-F5344CB8AC3E}">
-        <p14:creationId xmlns:p14="http://schemas.microsoft.com/office/powerpoint/2010/main" val="2544264309"/>
+        <p14:creationId xmlns:p14="http://schemas.microsoft.com/office/powerpoint/2010/main" val="386189332"/>
       </p:ext>
     </p:extLst>
   </p:cSld>
@@ -9448,7 +9728,7 @@
             <a:pPr lvl="1"/>
             <a:r>
               <a:rPr lang="en-US" sz="1600" dirty="0"/>
-              <a:t>friendly termination with SIGTERM, after timeout (default 10 seconds) with SIGKILL</a:t>
+              <a:t>friendly termination with SIGTERM, after timeout (default 10 seconds) with SIGKILL *</a:t>
             </a:r>
           </a:p>
           <a:p>
@@ -9973,6 +10253,56 @@
                 <a:cs typeface="Courier New" panose="02070309020205020404" pitchFamily="49" charset="0"/>
               </a:rPr>
               <a:t>$</a:t>
+            </a:r>
+          </a:p>
+        </p:txBody>
+      </p:sp>
+      <p:sp>
+        <p:nvSpPr>
+          <p:cNvPr id="2" name="TextBox 1">
+            <a:extLst>
+              <a:ext uri="{FF2B5EF4-FFF2-40B4-BE49-F238E27FC236}">
+                <a16:creationId xmlns:a16="http://schemas.microsoft.com/office/drawing/2014/main" id="{6F0859C0-3A07-4DCD-B4EF-FAB83CECD30F}"/>
+              </a:ext>
+            </a:extLst>
+          </p:cNvPr>
+          <p:cNvSpPr txBox="1"/>
+          <p:nvPr/>
+        </p:nvSpPr>
+        <p:spPr>
+          <a:xfrm>
+            <a:off x="574557" y="6156695"/>
+            <a:ext cx="6221255" cy="215444"/>
+          </a:xfrm>
+          <a:prstGeom prst="rect">
+            <a:avLst/>
+          </a:prstGeom>
+          <a:noFill/>
+        </p:spPr>
+        <p:txBody>
+          <a:bodyPr wrap="none" lIns="0" tIns="0" rIns="0" bIns="0" rtlCol="0">
+            <a:spAutoFit/>
+          </a:bodyPr>
+          <a:lstStyle/>
+          <a:p>
+            <a:pPr fontAlgn="base">
+              <a:spcBef>
+                <a:spcPct val="50000"/>
+              </a:spcBef>
+              <a:spcAft>
+                <a:spcPct val="0"/>
+              </a:spcAft>
+              <a:buClr>
+                <a:srgbClr val="F0AB00"/>
+              </a:buClr>
+              <a:buSzPct val="80000"/>
+            </a:pPr>
+            <a:r>
+              <a:rPr lang="en-US" sz="1400" kern="0" dirty="0">
+                <a:ea typeface="Arial Unicode MS" pitchFamily="34" charset="-128"/>
+                <a:cs typeface="Arial Unicode MS" pitchFamily="34" charset="-128"/>
+              </a:rPr>
+              <a:t>* you can specify wait time between SIGTERM and SIGKILL with the "-t" option</a:t>
             </a:r>
           </a:p>
         </p:txBody>
@@ -10515,7 +10845,7 @@
             <a:pPr lvl="0"/>
             <a:r>
               <a:rPr lang="en-US" sz="1800" dirty="0"/>
-              <a:t>Finally, a container can and should be removed</a:t>
+              <a:t>Finally, a container can and should be removed </a:t>
             </a:r>
           </a:p>
           <a:p>
@@ -12653,14 +12983,14 @@
             <a:pPr lvl="1"/>
             <a:r>
               <a:rPr lang="en-US" dirty="0"/>
-              <a:t>Containers can see each other by default</a:t>
+              <a:t>Containers can see each other by default </a:t>
             </a:r>
           </a:p>
           <a:p>
             <a:pPr lvl="1"/>
             <a:r>
               <a:rPr lang="en-US" dirty="0"/>
-              <a:t>not reachable from outside</a:t>
+              <a:t>Not reachable from outside</a:t>
             </a:r>
           </a:p>
           <a:p>
@@ -13354,15 +13684,23 @@
               <a:buNone/>
             </a:pPr>
             <a:r>
+              <a:rPr lang="en-US" sz="2000" dirty="0"/>
+              <a:t>Named volumes</a:t>
+            </a:r>
+          </a:p>
+          <a:p>
+            <a:pPr lvl="1"/>
+            <a:r>
               <a:rPr lang="en-US" dirty="0"/>
-              <a:t>Named volumes</a:t>
-            </a:r>
-          </a:p>
-          <a:p>
-            <a:pPr lvl="1"/>
+              <a:t>Contents in container are </a:t>
+            </a:r>
+            <a:r>
+              <a:rPr lang="en-US" i="1" dirty="0"/>
+              <a:t>merged</a:t>
+            </a:r>
             <a:r>
               <a:rPr lang="en-US" dirty="0"/>
-              <a:t>Contents in container are merged with volume</a:t>
+              <a:t> with volume</a:t>
             </a:r>
           </a:p>
           <a:p>
@@ -18403,7 +18741,7 @@
                 <a:ea typeface="Arial Unicode MS" pitchFamily="34" charset="-128"/>
                 <a:cs typeface="Arial Unicode MS" pitchFamily="34" charset="-128"/>
               </a:rPr>
-              <a:t>Running an interactive session required –</a:t>
+              <a:t>Running an interactive session requires –</a:t>
             </a:r>
             <a:r>
               <a:rPr lang="en-US" sz="1800" kern="0" dirty="0" err="1">
@@ -18417,7 +18755,7 @@
                 <a:ea typeface="Arial Unicode MS" pitchFamily="34" charset="-128"/>
                 <a:cs typeface="Arial Unicode MS" pitchFamily="34" charset="-128"/>
               </a:rPr>
-              <a:t> &amp; -t .</a:t>
+              <a:t> &amp; -t :</a:t>
             </a:r>
           </a:p>
           <a:p>
@@ -18856,8 +19194,13 @@
             <a:pPr lvl="1"/>
             <a:r>
               <a:rPr lang="en-US" sz="1600" dirty="0"/>
-              <a:t>programs like do not interact with the user</a:t>
-            </a:r>
+              <a:t>Programs like these do not interact with the user via stdin/</a:t>
+            </a:r>
+            <a:r>
+              <a:rPr lang="en-US" sz="1600" dirty="0" err="1"/>
+              <a:t>stdout</a:t>
+            </a:r>
+            <a:endParaRPr lang="en-US" sz="1600" dirty="0"/>
           </a:p>
           <a:p>
             <a:pPr lvl="2"/>
@@ -18917,7 +19260,15 @@
             <a:pPr lvl="1"/>
             <a:r>
               <a:rPr lang="en-US" sz="1600" dirty="0"/>
-              <a:t>Programs that expect user input must be started in interactive mode or they just exit</a:t>
+              <a:t>Programs that expect user input (via stdin/</a:t>
+            </a:r>
+            <a:r>
+              <a:rPr lang="en-US" sz="1600" dirty="0" err="1"/>
+              <a:t>stdout</a:t>
+            </a:r>
+            <a:r>
+              <a:rPr lang="en-US" sz="1600" dirty="0"/>
+              <a:t>) must be started in interactive mode or they just exit</a:t>
             </a:r>
           </a:p>
           <a:p>
@@ -19306,7 +19657,7 @@
           <a:p>
             <a:r>
               <a:rPr lang="en-US" sz="1800" dirty="0"/>
-              <a:t>Available/present containers</a:t>
+              <a:t>Available / present containers</a:t>
             </a:r>
           </a:p>
           <a:p>
@@ -20975,7 +21326,7 @@
             <a:pPr lvl="0"/>
             <a:r>
               <a:rPr lang="en-US" sz="1800" dirty="0"/>
-              <a:t>Possible to run additional commands in a container</a:t>
+              <a:t>It is possible to run additional commands in a container</a:t>
             </a:r>
           </a:p>
           <a:p>
@@ -21607,7 +21958,7 @@
             <a:pPr lvl="1"/>
             <a:r>
               <a:rPr lang="en-US" sz="1600" dirty="0"/>
-              <a:t>container does not get removed but remains</a:t>
+              <a:t>container does not get deleted (removed) but remains</a:t>
             </a:r>
           </a:p>
           <a:p>

</xml_diff>